<commit_message>
Renamed referrer to partner
terminology updated
</commit_message>
<xml_diff>
--- a/Outbound Integrations.pptx
+++ b/Outbound Integrations.pptx
@@ -2287,7 +2287,7 @@
       <dgm:spPr/>
     </dgm:pt>
     <dgm:pt modelId="{09FF6060-8DC7-4756-A198-32CF5B8EF8FF}" type="pres">
-      <dgm:prSet presAssocID="{578C39D7-99D7-41D4-8B07-E24F242726F3}" presName="node" presStyleLbl="node1" presStyleIdx="3" presStyleCnt="4">
+      <dgm:prSet presAssocID="{578C39D7-99D7-41D4-8B07-E24F242726F3}" presName="node" presStyleLbl="node1" presStyleIdx="3" presStyleCnt="4" custScaleX="143804">
         <dgm:presLayoutVars>
           <dgm:bulletEnabled val="1"/>
         </dgm:presLayoutVars>
@@ -2856,8 +2856,8 @@
       </dsp:nvSpPr>
       <dsp:spPr>
         <a:xfrm>
-          <a:off x="1090817" y="527"/>
-          <a:ext cx="878631" cy="571110"/>
+          <a:off x="897405" y="555"/>
+          <a:ext cx="755823" cy="491285"/>
         </a:xfrm>
         <a:prstGeom prst="roundRect">
           <a:avLst/>
@@ -2924,8 +2924,8 @@
         </a:p>
       </dsp:txBody>
       <dsp:txXfrm>
-        <a:off x="1118696" y="28406"/>
-        <a:ext cx="822873" cy="515352"/>
+        <a:off x="921388" y="24538"/>
+        <a:ext cx="707857" cy="443319"/>
       </dsp:txXfrm>
     </dsp:sp>
     <dsp:sp modelId="{86FE89EC-47EA-4C6A-8234-3A6150BF9715}">
@@ -2935,8 +2935,8 @@
       </dsp:nvSpPr>
       <dsp:spPr>
         <a:xfrm>
-          <a:off x="585109" y="286083"/>
-          <a:ext cx="1890046" cy="1890046"/>
+          <a:off x="464152" y="246198"/>
+          <a:ext cx="1622331" cy="1622331"/>
         </a:xfrm>
         <a:custGeom>
           <a:avLst/>
@@ -2947,9 +2947,9 @@
           <a:pathLst>
             <a:path>
               <a:moveTo>
-                <a:pt x="1506068" y="184564"/>
+                <a:pt x="1293267" y="158810"/>
               </a:moveTo>
-              <a:arcTo wR="945023" hR="945023" stAng="18385132" swAng="1636586"/>
+              <a:arcTo wR="811165" hR="811165" stAng="18387904" swAng="1632605"/>
             </a:path>
           </a:pathLst>
         </a:custGeom>
@@ -2989,8 +2989,8 @@
       </dsp:nvSpPr>
       <dsp:spPr>
         <a:xfrm>
-          <a:off x="2035840" y="945551"/>
-          <a:ext cx="878631" cy="571110"/>
+          <a:off x="1708571" y="811721"/>
+          <a:ext cx="755823" cy="491285"/>
         </a:xfrm>
         <a:prstGeom prst="roundRect">
           <a:avLst/>
@@ -3057,8 +3057,8 @@
         </a:p>
       </dsp:txBody>
       <dsp:txXfrm>
-        <a:off x="2063719" y="973430"/>
-        <a:ext cx="822873" cy="515352"/>
+        <a:off x="1732554" y="835704"/>
+        <a:ext cx="707857" cy="443319"/>
       </dsp:txXfrm>
     </dsp:sp>
     <dsp:sp modelId="{E1B72896-3F78-470B-A9D9-A62BA65C81D8}">
@@ -3068,8 +3068,8 @@
       </dsp:nvSpPr>
       <dsp:spPr>
         <a:xfrm>
-          <a:off x="585109" y="286083"/>
-          <a:ext cx="1890046" cy="1890046"/>
+          <a:off x="464152" y="246198"/>
+          <a:ext cx="1622331" cy="1622331"/>
         </a:xfrm>
         <a:custGeom>
           <a:avLst/>
@@ -3080,9 +3080,9 @@
           <a:pathLst>
             <a:path>
               <a:moveTo>
-                <a:pt x="1792189" y="1363805"/>
+                <a:pt x="1538208" y="1170885"/>
               </a:moveTo>
-              <a:arcTo wR="945023" hR="945023" stAng="1578282" swAng="1636586"/>
+              <a:arcTo wR="811165" hR="811165" stAng="1579492" swAng="1632605"/>
             </a:path>
           </a:pathLst>
         </a:custGeom>
@@ -3122,8 +3122,8 @@
       </dsp:nvSpPr>
       <dsp:spPr>
         <a:xfrm>
-          <a:off x="1090817" y="1890574"/>
-          <a:ext cx="878631" cy="571110"/>
+          <a:off x="897405" y="1622886"/>
+          <a:ext cx="755823" cy="491285"/>
         </a:xfrm>
         <a:prstGeom prst="roundRect">
           <a:avLst/>
@@ -3208,8 +3208,8 @@
         </a:p>
       </dsp:txBody>
       <dsp:txXfrm>
-        <a:off x="1118696" y="1918453"/>
-        <a:ext cx="822873" cy="515352"/>
+        <a:off x="921388" y="1646869"/>
+        <a:ext cx="707857" cy="443319"/>
       </dsp:txXfrm>
     </dsp:sp>
     <dsp:sp modelId="{F8EEFE25-0600-46BF-9D4E-64B828926DAC}">
@@ -3219,8 +3219,8 @@
       </dsp:nvSpPr>
       <dsp:spPr>
         <a:xfrm>
-          <a:off x="585109" y="286083"/>
-          <a:ext cx="1890046" cy="1890046"/>
+          <a:off x="464152" y="246198"/>
+          <a:ext cx="1622331" cy="1622331"/>
         </a:xfrm>
         <a:custGeom>
           <a:avLst/>
@@ -3231,9 +3231,9 @@
           <a:pathLst>
             <a:path>
               <a:moveTo>
-                <a:pt x="383978" y="1705482"/>
+                <a:pt x="329063" y="1463520"/>
               </a:moveTo>
-              <a:arcTo wR="945023" hR="945023" stAng="7585132" swAng="1636586"/>
+              <a:arcTo wR="811165" hR="811165" stAng="7587904" swAng="1632605"/>
             </a:path>
           </a:pathLst>
         </a:custGeom>
@@ -3273,8 +3273,8 @@
       </dsp:nvSpPr>
       <dsp:spPr>
         <a:xfrm>
-          <a:off x="145794" y="945551"/>
-          <a:ext cx="878631" cy="571110"/>
+          <a:off x="-79300" y="811721"/>
+          <a:ext cx="1086904" cy="491285"/>
         </a:xfrm>
         <a:prstGeom prst="roundRect">
           <a:avLst/>
@@ -3341,8 +3341,8 @@
         </a:p>
       </dsp:txBody>
       <dsp:txXfrm>
-        <a:off x="173673" y="973430"/>
-        <a:ext cx="822873" cy="515352"/>
+        <a:off x="-55317" y="835704"/>
+        <a:ext cx="1038938" cy="443319"/>
       </dsp:txXfrm>
     </dsp:sp>
     <dsp:sp modelId="{C2454825-54E6-44F0-B9F4-69843EF7F8F0}">
@@ -3352,8 +3352,8 @@
       </dsp:nvSpPr>
       <dsp:spPr>
         <a:xfrm>
-          <a:off x="585109" y="286083"/>
-          <a:ext cx="1890046" cy="1890046"/>
+          <a:off x="464152" y="246198"/>
+          <a:ext cx="1622331" cy="1622331"/>
         </a:xfrm>
         <a:custGeom>
           <a:avLst/>
@@ -3364,9 +3364,9 @@
           <a:pathLst>
             <a:path>
               <a:moveTo>
-                <a:pt x="97857" y="526241"/>
+                <a:pt x="84122" y="451445"/>
               </a:moveTo>
-              <a:arcTo wR="945023" hR="945023" stAng="12378282" swAng="1636586"/>
+              <a:arcTo wR="811165" hR="811165" stAng="12379492" swAng="1632605"/>
             </a:path>
           </a:pathLst>
         </a:custGeom>
@@ -7406,7 +7406,7 @@
           <a:p>
             <a:fld id="{35ACAB7E-9791-46EF-9C56-9B9A6246B142}" type="datetimeFigureOut">
               <a:rPr lang="en-AU" smtClean="0"/>
-              <a:t>1/04/2018</a:t>
+              <a:t>4/04/2018</a:t>
             </a:fld>
             <a:endParaRPr lang="en-AU"/>
           </a:p>
@@ -8159,7 +8159,7 @@
           <a:p>
             <a:fld id="{D3A58CAA-286E-417A-8488-C377A93EE4A8}" type="datetimeFigureOut">
               <a:rPr lang="en-AU" smtClean="0"/>
-              <a:t>1/04/2018</a:t>
+              <a:t>4/04/2018</a:t>
             </a:fld>
             <a:endParaRPr lang="en-AU"/>
           </a:p>
@@ -8359,7 +8359,7 @@
           <a:p>
             <a:fld id="{D3A58CAA-286E-417A-8488-C377A93EE4A8}" type="datetimeFigureOut">
               <a:rPr lang="en-AU" smtClean="0"/>
-              <a:t>1/04/2018</a:t>
+              <a:t>4/04/2018</a:t>
             </a:fld>
             <a:endParaRPr lang="en-AU"/>
           </a:p>
@@ -8569,7 +8569,7 @@
           <a:p>
             <a:fld id="{D3A58CAA-286E-417A-8488-C377A93EE4A8}" type="datetimeFigureOut">
               <a:rPr lang="en-AU" smtClean="0"/>
-              <a:t>1/04/2018</a:t>
+              <a:t>4/04/2018</a:t>
             </a:fld>
             <a:endParaRPr lang="en-AU"/>
           </a:p>
@@ -8769,7 +8769,7 @@
           <a:p>
             <a:fld id="{D3A58CAA-286E-417A-8488-C377A93EE4A8}" type="datetimeFigureOut">
               <a:rPr lang="en-AU" smtClean="0"/>
-              <a:t>1/04/2018</a:t>
+              <a:t>4/04/2018</a:t>
             </a:fld>
             <a:endParaRPr lang="en-AU"/>
           </a:p>
@@ -9045,7 +9045,7 @@
           <a:p>
             <a:fld id="{D3A58CAA-286E-417A-8488-C377A93EE4A8}" type="datetimeFigureOut">
               <a:rPr lang="en-AU" smtClean="0"/>
-              <a:t>1/04/2018</a:t>
+              <a:t>4/04/2018</a:t>
             </a:fld>
             <a:endParaRPr lang="en-AU"/>
           </a:p>
@@ -9313,7 +9313,7 @@
           <a:p>
             <a:fld id="{D3A58CAA-286E-417A-8488-C377A93EE4A8}" type="datetimeFigureOut">
               <a:rPr lang="en-AU" smtClean="0"/>
-              <a:t>1/04/2018</a:t>
+              <a:t>4/04/2018</a:t>
             </a:fld>
             <a:endParaRPr lang="en-AU"/>
           </a:p>
@@ -9728,7 +9728,7 @@
           <a:p>
             <a:fld id="{D3A58CAA-286E-417A-8488-C377A93EE4A8}" type="datetimeFigureOut">
               <a:rPr lang="en-AU" smtClean="0"/>
-              <a:t>1/04/2018</a:t>
+              <a:t>4/04/2018</a:t>
             </a:fld>
             <a:endParaRPr lang="en-AU"/>
           </a:p>
@@ -9870,7 +9870,7 @@
           <a:p>
             <a:fld id="{D3A58CAA-286E-417A-8488-C377A93EE4A8}" type="datetimeFigureOut">
               <a:rPr lang="en-AU" smtClean="0"/>
-              <a:t>1/04/2018</a:t>
+              <a:t>4/04/2018</a:t>
             </a:fld>
             <a:endParaRPr lang="en-AU"/>
           </a:p>
@@ -9983,7 +9983,7 @@
           <a:p>
             <a:fld id="{D3A58CAA-286E-417A-8488-C377A93EE4A8}" type="datetimeFigureOut">
               <a:rPr lang="en-AU" smtClean="0"/>
-              <a:t>1/04/2018</a:t>
+              <a:t>4/04/2018</a:t>
             </a:fld>
             <a:endParaRPr lang="en-AU"/>
           </a:p>
@@ -10296,7 +10296,7 @@
           <a:p>
             <a:fld id="{D3A58CAA-286E-417A-8488-C377A93EE4A8}" type="datetimeFigureOut">
               <a:rPr lang="en-AU" smtClean="0"/>
-              <a:t>1/04/2018</a:t>
+              <a:t>4/04/2018</a:t>
             </a:fld>
             <a:endParaRPr lang="en-AU"/>
           </a:p>
@@ -10585,7 +10585,7 @@
           <a:p>
             <a:fld id="{D3A58CAA-286E-417A-8488-C377A93EE4A8}" type="datetimeFigureOut">
               <a:rPr lang="en-AU" smtClean="0"/>
-              <a:t>1/04/2018</a:t>
+              <a:t>4/04/2018</a:t>
             </a:fld>
             <a:endParaRPr lang="en-AU"/>
           </a:p>
@@ -10828,7 +10828,7 @@
           <a:p>
             <a:fld id="{D3A58CAA-286E-417A-8488-C377A93EE4A8}" type="datetimeFigureOut">
               <a:rPr lang="en-AU" smtClean="0"/>
-              <a:t>1/04/2018</a:t>
+              <a:t>4/04/2018</a:t>
             </a:fld>
             <a:endParaRPr lang="en-AU"/>
           </a:p>
@@ -11573,8 +11573,8 @@
         </p:blipFill>
         <p:spPr>
           <a:xfrm>
-            <a:off x="5637629" y="2827949"/>
-            <a:ext cx="890911" cy="890911"/>
+            <a:off x="5679804" y="1868570"/>
+            <a:ext cx="662002" cy="662002"/>
           </a:xfrm>
           <a:prstGeom prst="rect">
             <a:avLst/>
@@ -11709,14 +11709,14 @@
           <p:nvPr>
             <p:extLst>
               <p:ext uri="{D42A27DB-BD31-4B8C-83A1-F6EECF244321}">
-                <p14:modId xmlns:p14="http://schemas.microsoft.com/office/powerpoint/2010/main" val="1901544310"/>
+                <p14:modId xmlns:p14="http://schemas.microsoft.com/office/powerpoint/2010/main" val="1415103806"/>
               </p:ext>
             </p:extLst>
           </p:nvPr>
         </p:nvGraphicFramePr>
         <p:xfrm>
-          <a:off x="793201" y="4020127"/>
-          <a:ext cx="3060266" cy="2462213"/>
+          <a:off x="1061598" y="3962787"/>
+          <a:ext cx="2385095" cy="2114728"/>
         </p:xfrm>
         <a:graphic>
           <a:graphicData uri="http://schemas.openxmlformats.org/drawingml/2006/diagram">
@@ -11738,8 +11738,8 @@
         </p:nvSpPr>
         <p:spPr>
           <a:xfrm>
-            <a:off x="5184649" y="3886312"/>
-            <a:ext cx="2199349" cy="1631216"/>
+            <a:off x="5124645" y="2565299"/>
+            <a:ext cx="1905777" cy="553998"/>
           </a:xfrm>
           <a:prstGeom prst="rect">
             <a:avLst/>
@@ -11753,78 +11753,73 @@
           <a:lstStyle/>
           <a:p>
             <a:r>
-              <a:rPr lang="en-AU" sz="1000" dirty="0"/>
+              <a:rPr lang="en-AU" sz="1000" dirty="0">
+                <a:solidFill>
+                  <a:schemeClr val="accent1">
+                    <a:lumMod val="75000"/>
+                  </a:schemeClr>
+                </a:solidFill>
+              </a:rPr>
               <a:t>Topic – Become A Member</a:t>
             </a:r>
           </a:p>
           <a:p>
             <a:r>
-              <a:rPr lang="en-AU" sz="1000" dirty="0"/>
+              <a:rPr lang="en-AU" sz="1000" dirty="0">
+                <a:solidFill>
+                  <a:schemeClr val="accent1">
+                    <a:lumMod val="75000"/>
+                  </a:schemeClr>
+                </a:solidFill>
+              </a:rPr>
               <a:t>Event Type - </a:t>
             </a:r>
             <a:r>
-              <a:rPr lang="en-AU" sz="1000" dirty="0" err="1"/>
+              <a:rPr lang="en-AU" sz="1000" dirty="0" err="1">
+                <a:solidFill>
+                  <a:schemeClr val="accent1">
+                    <a:lumMod val="75000"/>
+                  </a:schemeClr>
+                </a:solidFill>
+              </a:rPr>
               <a:t>Purchase.Created</a:t>
             </a:r>
-            <a:endParaRPr lang="en-AU" sz="1000" dirty="0"/>
-          </a:p>
-          <a:p>
-            <a:r>
-              <a:rPr lang="en-AU" sz="1000" dirty="0"/>
+            <a:endParaRPr lang="en-AU" sz="1000" dirty="0">
+              <a:solidFill>
+                <a:schemeClr val="accent1">
+                  <a:lumMod val="75000"/>
+                </a:schemeClr>
+              </a:solidFill>
+            </a:endParaRPr>
+          </a:p>
+          <a:p>
+            <a:r>
+              <a:rPr lang="en-AU" sz="1000" dirty="0">
+                <a:solidFill>
+                  <a:schemeClr val="accent1">
+                    <a:lumMod val="75000"/>
+                  </a:schemeClr>
+                </a:solidFill>
+              </a:rPr>
               <a:t>Event Type - </a:t>
             </a:r>
             <a:r>
-              <a:rPr lang="en-AU" sz="1000" dirty="0" err="1"/>
+              <a:rPr lang="en-AU" sz="1000" dirty="0" err="1">
+                <a:solidFill>
+                  <a:schemeClr val="accent1">
+                    <a:lumMod val="75000"/>
+                  </a:schemeClr>
+                </a:solidFill>
+              </a:rPr>
               <a:t>Purchase.Fulfilled</a:t>
             </a:r>
-            <a:endParaRPr lang="en-AU" sz="1000" dirty="0"/>
-          </a:p>
-          <a:p>
-            <a:pPr marL="285750" indent="-285750">
-              <a:buFont typeface="Arial" panose="020B0604020202020204" pitchFamily="34" charset="0"/>
-              <a:buChar char="•"/>
-            </a:pPr>
-            <a:endParaRPr lang="en-AU" sz="1000" dirty="0"/>
-          </a:p>
-          <a:p>
-            <a:r>
-              <a:rPr lang="en-AU" sz="1000" dirty="0"/>
-              <a:t>Topic – Resolve My Complaint</a:t>
-            </a:r>
-          </a:p>
-          <a:p>
-            <a:r>
-              <a:rPr lang="en-AU" sz="1000" dirty="0"/>
-              <a:t>Event Type - </a:t>
-            </a:r>
-            <a:r>
-              <a:rPr lang="en-AU" sz="1000" dirty="0" err="1"/>
-              <a:t>Purchase.PartialRefund</a:t>
-            </a:r>
-            <a:endParaRPr lang="en-AU" sz="1000" dirty="0"/>
-          </a:p>
-          <a:p>
-            <a:endParaRPr lang="en-AU" sz="1000" dirty="0"/>
-          </a:p>
-          <a:p>
-            <a:r>
-              <a:rPr lang="en-AU" sz="1000" dirty="0"/>
-              <a:t>Topic – Cancel My Membership</a:t>
-            </a:r>
-          </a:p>
-          <a:p>
-            <a:r>
-              <a:rPr lang="en-AU" sz="1000" dirty="0"/>
-              <a:t>Event Type - </a:t>
-            </a:r>
-            <a:r>
-              <a:rPr lang="en-AU" sz="1000" dirty="0" err="1"/>
-              <a:t>Purchase.Refunded</a:t>
-            </a:r>
-            <a:endParaRPr lang="en-AU" sz="1000" dirty="0"/>
-          </a:p>
-          <a:p>
-            <a:endParaRPr lang="en-AU" sz="1000" dirty="0"/>
+            <a:endParaRPr lang="en-AU" sz="1000" dirty="0">
+              <a:solidFill>
+                <a:schemeClr val="accent1">
+                  <a:lumMod val="75000"/>
+                </a:schemeClr>
+              </a:solidFill>
+            </a:endParaRPr>
           </a:p>
         </p:txBody>
       </p:sp>
@@ -11859,7 +11854,7 @@
         </p:blipFill>
         <p:spPr>
           <a:xfrm>
-            <a:off x="9325316" y="2110833"/>
+            <a:off x="9274510" y="1662706"/>
             <a:ext cx="933981" cy="1005570"/>
           </a:xfrm>
           <a:prstGeom prst="rect">
@@ -11881,7 +11876,7 @@
         </p:nvSpPr>
         <p:spPr>
           <a:xfrm>
-            <a:off x="9325316" y="1334785"/>
+            <a:off x="9274510" y="886658"/>
             <a:ext cx="3442900" cy="646331"/>
           </a:xfrm>
           <a:prstGeom prst="rect">
@@ -11897,13 +11892,13 @@
           <a:p>
             <a:r>
               <a:rPr lang="en-AU" sz="2000" b="1" u="sng" dirty="0"/>
-              <a:t>Referrer-A APIs</a:t>
+              <a:t>Partner-A APIs</a:t>
             </a:r>
           </a:p>
           <a:p>
             <a:r>
               <a:rPr lang="en-AU" sz="1600" dirty="0"/>
-              <a:t>multiple notification operations</a:t>
+              <a:t>distinct notification operations</a:t>
             </a:r>
           </a:p>
         </p:txBody>
@@ -11926,8 +11921,8 @@
         </p:nvCxnSpPr>
         <p:spPr>
           <a:xfrm flipV="1">
-            <a:off x="6528540" y="2613618"/>
-            <a:ext cx="2796776" cy="659787"/>
+            <a:off x="6341806" y="2165491"/>
+            <a:ext cx="2932704" cy="34080"/>
           </a:xfrm>
           <a:prstGeom prst="straightConnector1">
             <a:avLst/>
@@ -11970,9 +11965,9 @@
           <p:nvPr/>
         </p:nvSpPr>
         <p:spPr>
-          <a:xfrm rot="20771503">
-            <a:off x="7093740" y="2444260"/>
-            <a:ext cx="2312499" cy="307777"/>
+          <a:xfrm>
+            <a:off x="7356453" y="1781789"/>
+            <a:ext cx="2234793" cy="307777"/>
           </a:xfrm>
           <a:prstGeom prst="rect">
             <a:avLst/>
@@ -11986,8 +11981,8 @@
           <a:lstStyle/>
           <a:p>
             <a:r>
-              <a:rPr lang="en-AU" sz="1400" dirty="0"/>
-              <a:t>filter = “Referrer-A”</a:t>
+              <a:rPr lang="en-AU" sz="1400" b="1" dirty="0"/>
+              <a:t>sub filter = “Partner-A”</a:t>
             </a:r>
           </a:p>
         </p:txBody>
@@ -12023,7 +12018,7 @@
         </p:blipFill>
         <p:spPr>
           <a:xfrm>
-            <a:off x="9325316" y="4145079"/>
+            <a:off x="9276156" y="5020151"/>
             <a:ext cx="933981" cy="1005570"/>
           </a:xfrm>
           <a:prstGeom prst="rect">
@@ -12045,7 +12040,7 @@
         </p:nvSpPr>
         <p:spPr>
           <a:xfrm>
-            <a:off x="9323670" y="3449412"/>
+            <a:off x="9274510" y="4324484"/>
             <a:ext cx="2576711" cy="892552"/>
           </a:xfrm>
           <a:prstGeom prst="rect">
@@ -12061,7 +12056,7 @@
           <a:p>
             <a:r>
               <a:rPr lang="en-AU" sz="2000" b="1" u="sng" dirty="0"/>
-              <a:t>Referrer-B API</a:t>
+              <a:t>Partner-B API</a:t>
             </a:r>
           </a:p>
           <a:p>
@@ -12093,8 +12088,8 @@
         </p:nvCxnSpPr>
         <p:spPr>
           <a:xfrm>
-            <a:off x="6528540" y="3273405"/>
-            <a:ext cx="2796776" cy="1374459"/>
+            <a:off x="6341806" y="2199571"/>
+            <a:ext cx="2934350" cy="3323365"/>
           </a:xfrm>
           <a:prstGeom prst="straightConnector1">
             <a:avLst/>
@@ -12138,8 +12133,8 @@
         </p:nvSpPr>
         <p:spPr>
           <a:xfrm>
-            <a:off x="5225914" y="1941133"/>
-            <a:ext cx="1511571" cy="400110"/>
+            <a:off x="4770590" y="1177839"/>
+            <a:ext cx="2464106" cy="615553"/>
           </a:xfrm>
           <a:prstGeom prst="rect">
             <a:avLst/>
@@ -12152,10 +12147,19 @@
           </a:bodyPr>
           <a:lstStyle/>
           <a:p>
+            <a:pPr algn="ctr"/>
             <a:r>
               <a:rPr lang="en-AU" sz="2000" b="1" u="sng" dirty="0"/>
               <a:t>Insurer HUB</a:t>
             </a:r>
+          </a:p>
+          <a:p>
+            <a:pPr algn="ctr"/>
+            <a:r>
+              <a:rPr lang="en-AU" sz="1400" dirty="0"/>
+              <a:t>route events to subscribers</a:t>
+            </a:r>
+            <a:endParaRPr lang="en-AU" sz="1400" b="1" u="sng" dirty="0"/>
           </a:p>
         </p:txBody>
       </p:sp>
@@ -12219,19 +12223,17 @@
           <p:cNvCxnSpPr>
             <a:cxnSpLocks/>
             <a:stCxn id="6" idx="3"/>
-            <a:endCxn id="9" idx="1"/>
+            <a:endCxn id="56" idx="2"/>
           </p:cNvCxnSpPr>
           <p:nvPr/>
         </p:nvCxnSpPr>
         <p:spPr>
           <a:xfrm flipV="1">
-            <a:off x="2842499" y="3273405"/>
-            <a:ext cx="2795130" cy="179"/>
+            <a:off x="2842499" y="2199073"/>
+            <a:ext cx="2103774" cy="1074511"/>
           </a:xfrm>
-          <a:prstGeom prst="bentConnector3">
-            <a:avLst>
-              <a:gd name="adj1" fmla="val 50000"/>
-            </a:avLst>
+          <a:prstGeom prst="curvedConnector3">
+            <a:avLst/>
           </a:prstGeom>
           <a:ln w="25400" cap="flat" cmpd="sng" algn="ctr">
             <a:solidFill>
@@ -12287,7 +12289,7 @@
           <a:lstStyle/>
           <a:p>
             <a:r>
-              <a:rPr lang="en-AU" sz="1400" dirty="0"/>
+              <a:rPr lang="en-AU" sz="1400" b="1" dirty="0"/>
               <a:t>drive policy lifecycle</a:t>
             </a:r>
           </a:p>
@@ -12307,8 +12309,8 @@
         </p:nvSpPr>
         <p:spPr>
           <a:xfrm>
-            <a:off x="3141555" y="3371086"/>
-            <a:ext cx="2068345" cy="307777"/>
+            <a:off x="3902294" y="2850405"/>
+            <a:ext cx="1204105" cy="523220"/>
           </a:xfrm>
           <a:prstGeom prst="rect">
             <a:avLst/>
@@ -12322,8 +12324,14 @@
           <a:lstStyle/>
           <a:p>
             <a:r>
-              <a:rPr lang="en-AU" sz="1400" dirty="0"/>
-              <a:t>push events to hub topics</a:t>
+              <a:rPr lang="en-AU" sz="1400" b="1" dirty="0"/>
+              <a:t>push events </a:t>
+            </a:r>
+          </a:p>
+          <a:p>
+            <a:r>
+              <a:rPr lang="en-AU" sz="1400" b="1" dirty="0"/>
+              <a:t>to hub topics</a:t>
             </a:r>
           </a:p>
         </p:txBody>
@@ -12341,9 +12349,9 @@
           <p:nvPr/>
         </p:nvSpPr>
         <p:spPr>
-          <a:xfrm rot="1623682">
-            <a:off x="7327423" y="3840809"/>
-            <a:ext cx="2312499" cy="307777"/>
+          <a:xfrm>
+            <a:off x="7430886" y="5604573"/>
+            <a:ext cx="1876679" cy="307777"/>
           </a:xfrm>
           <a:prstGeom prst="rect">
             <a:avLst/>
@@ -12357,18 +12365,18 @@
           <a:lstStyle/>
           <a:p>
             <a:r>
-              <a:rPr lang="en-AU" sz="1400" dirty="0"/>
-              <a:t>filter = “Referrer-B”</a:t>
+              <a:rPr lang="en-AU" sz="1400" b="1" dirty="0"/>
+              <a:t>sub filter = “Partner-B”</a:t>
             </a:r>
           </a:p>
         </p:txBody>
       </p:sp>
       <p:sp>
         <p:nvSpPr>
-          <p:cNvPr id="27" name="TextBox 26">
-            <a:extLst>
-              <a:ext uri="{FF2B5EF4-FFF2-40B4-BE49-F238E27FC236}">
-                <a16:creationId xmlns:a16="http://schemas.microsoft.com/office/drawing/2014/main" id="{1C9EF330-15EB-428E-B4E6-FBD8B6D698E4}"/>
+          <p:cNvPr id="28" name="TextBox 27">
+            <a:extLst>
+              <a:ext uri="{FF2B5EF4-FFF2-40B4-BE49-F238E27FC236}">
+                <a16:creationId xmlns:a16="http://schemas.microsoft.com/office/drawing/2014/main" id="{26409931-DAC4-4847-B1E3-5AAD6CB825E3}"/>
               </a:ext>
             </a:extLst>
           </p:cNvPr>
@@ -12377,42 +12385,7 @@
         </p:nvSpPr>
         <p:spPr>
           <a:xfrm>
-            <a:off x="4896999" y="2329494"/>
-            <a:ext cx="2357166" cy="307777"/>
-          </a:xfrm>
-          <a:prstGeom prst="rect">
-            <a:avLst/>
-          </a:prstGeom>
-          <a:noFill/>
-        </p:spPr>
-        <p:txBody>
-          <a:bodyPr wrap="square" rtlCol="0">
-            <a:spAutoFit/>
-          </a:bodyPr>
-          <a:lstStyle/>
-          <a:p>
-            <a:r>
-              <a:rPr lang="en-AU" sz="1400" dirty="0"/>
-              <a:t>route events to subscribers</a:t>
-            </a:r>
-          </a:p>
-        </p:txBody>
-      </p:sp>
-      <p:sp>
-        <p:nvSpPr>
-          <p:cNvPr id="28" name="TextBox 27">
-            <a:extLst>
-              <a:ext uri="{FF2B5EF4-FFF2-40B4-BE49-F238E27FC236}">
-                <a16:creationId xmlns:a16="http://schemas.microsoft.com/office/drawing/2014/main" id="{26409931-DAC4-4847-B1E3-5AAD6CB825E3}"/>
-              </a:ext>
-            </a:extLst>
-          </p:cNvPr>
-          <p:cNvSpPr txBox="1"/>
-          <p:nvPr/>
-        </p:nvSpPr>
-        <p:spPr>
-          <a:xfrm>
-            <a:off x="10385082" y="2182731"/>
+            <a:off x="10208491" y="1714186"/>
             <a:ext cx="1860415" cy="861774"/>
           </a:xfrm>
           <a:prstGeom prst="rect">
@@ -12427,82 +12400,208 @@
           <a:lstStyle/>
           <a:p>
             <a:r>
-              <a:rPr lang="en-AU" sz="1000" dirty="0"/>
+              <a:rPr lang="en-AU" sz="1000" dirty="0">
+                <a:solidFill>
+                  <a:schemeClr val="accent1">
+                    <a:lumMod val="75000"/>
+                  </a:schemeClr>
+                </a:solidFill>
+              </a:rPr>
               <a:t>/</a:t>
             </a:r>
             <a:r>
-              <a:rPr lang="en-AU" sz="1000" dirty="0" err="1"/>
+              <a:rPr lang="en-AU" sz="1000" dirty="0" err="1">
+                <a:solidFill>
+                  <a:schemeClr val="accent1">
+                    <a:lumMod val="75000"/>
+                  </a:schemeClr>
+                </a:solidFill>
+              </a:rPr>
               <a:t>api</a:t>
             </a:r>
             <a:r>
-              <a:rPr lang="en-AU" sz="1000" dirty="0"/>
+              <a:rPr lang="en-AU" sz="1000" dirty="0">
+                <a:solidFill>
+                  <a:schemeClr val="accent1">
+                    <a:lumMod val="75000"/>
+                  </a:schemeClr>
+                </a:solidFill>
+              </a:rPr>
               <a:t>/</a:t>
             </a:r>
             <a:r>
-              <a:rPr lang="en-AU" sz="1000" dirty="0" err="1"/>
+              <a:rPr lang="en-AU" sz="1000" dirty="0" err="1">
+                <a:solidFill>
+                  <a:schemeClr val="accent1">
+                    <a:lumMod val="75000"/>
+                  </a:schemeClr>
+                </a:solidFill>
+              </a:rPr>
               <a:t>TransactionApproved</a:t>
             </a:r>
-            <a:endParaRPr lang="en-AU" sz="1000" dirty="0"/>
-          </a:p>
-          <a:p>
-            <a:r>
-              <a:rPr lang="en-AU" sz="1000" dirty="0"/>
+            <a:endParaRPr lang="en-AU" sz="1000" dirty="0">
+              <a:solidFill>
+                <a:schemeClr val="accent1">
+                  <a:lumMod val="75000"/>
+                </a:schemeClr>
+              </a:solidFill>
+            </a:endParaRPr>
+          </a:p>
+          <a:p>
+            <a:r>
+              <a:rPr lang="en-AU" sz="1000" dirty="0">
+                <a:solidFill>
+                  <a:schemeClr val="accent1">
+                    <a:lumMod val="75000"/>
+                  </a:schemeClr>
+                </a:solidFill>
+              </a:rPr>
               <a:t>/</a:t>
             </a:r>
             <a:r>
-              <a:rPr lang="en-AU" sz="1000" dirty="0" err="1"/>
+              <a:rPr lang="en-AU" sz="1000" dirty="0" err="1">
+                <a:solidFill>
+                  <a:schemeClr val="accent1">
+                    <a:lumMod val="75000"/>
+                  </a:schemeClr>
+                </a:solidFill>
+              </a:rPr>
               <a:t>api</a:t>
             </a:r>
             <a:r>
-              <a:rPr lang="en-AU" sz="1000" dirty="0"/>
+              <a:rPr lang="en-AU" sz="1000" dirty="0">
+                <a:solidFill>
+                  <a:schemeClr val="accent1">
+                    <a:lumMod val="75000"/>
+                  </a:schemeClr>
+                </a:solidFill>
+              </a:rPr>
               <a:t>/</a:t>
             </a:r>
             <a:r>
-              <a:rPr lang="en-AU" sz="1000" dirty="0" err="1"/>
+              <a:rPr lang="en-AU" sz="1000" dirty="0" err="1">
+                <a:solidFill>
+                  <a:schemeClr val="accent1">
+                    <a:lumMod val="75000"/>
+                  </a:schemeClr>
+                </a:solidFill>
+              </a:rPr>
               <a:t>TransactionUpdated</a:t>
             </a:r>
-            <a:endParaRPr lang="en-AU" sz="1000" dirty="0"/>
-          </a:p>
-          <a:p>
-            <a:r>
-              <a:rPr lang="en-AU" sz="1000" dirty="0"/>
+            <a:endParaRPr lang="en-AU" sz="1000" dirty="0">
+              <a:solidFill>
+                <a:schemeClr val="accent1">
+                  <a:lumMod val="75000"/>
+                </a:schemeClr>
+              </a:solidFill>
+            </a:endParaRPr>
+          </a:p>
+          <a:p>
+            <a:r>
+              <a:rPr lang="en-AU" sz="1000" dirty="0">
+                <a:solidFill>
+                  <a:schemeClr val="accent1">
+                    <a:lumMod val="75000"/>
+                  </a:schemeClr>
+                </a:solidFill>
+              </a:rPr>
               <a:t>/</a:t>
             </a:r>
             <a:r>
-              <a:rPr lang="en-AU" sz="1000" dirty="0" err="1"/>
+              <a:rPr lang="en-AU" sz="1000" dirty="0" err="1">
+                <a:solidFill>
+                  <a:schemeClr val="accent1">
+                    <a:lumMod val="75000"/>
+                  </a:schemeClr>
+                </a:solidFill>
+              </a:rPr>
               <a:t>api</a:t>
             </a:r>
             <a:r>
-              <a:rPr lang="en-AU" sz="1000" dirty="0"/>
+              <a:rPr lang="en-AU" sz="1000" dirty="0">
+                <a:solidFill>
+                  <a:schemeClr val="accent1">
+                    <a:lumMod val="75000"/>
+                  </a:schemeClr>
+                </a:solidFill>
+              </a:rPr>
               <a:t>/</a:t>
             </a:r>
             <a:r>
-              <a:rPr lang="en-AU" sz="1000" dirty="0" err="1"/>
+              <a:rPr lang="en-AU" sz="1000" dirty="0" err="1">
+                <a:solidFill>
+                  <a:schemeClr val="accent1">
+                    <a:lumMod val="75000"/>
+                  </a:schemeClr>
+                </a:solidFill>
+              </a:rPr>
               <a:t>TransactionPartialRefund</a:t>
             </a:r>
-            <a:endParaRPr lang="en-AU" sz="1000" dirty="0"/>
-          </a:p>
-          <a:p>
-            <a:r>
-              <a:rPr lang="en-AU" sz="1000" dirty="0"/>
+            <a:endParaRPr lang="en-AU" sz="1000" dirty="0">
+              <a:solidFill>
+                <a:schemeClr val="accent1">
+                  <a:lumMod val="75000"/>
+                </a:schemeClr>
+              </a:solidFill>
+            </a:endParaRPr>
+          </a:p>
+          <a:p>
+            <a:r>
+              <a:rPr lang="en-AU" sz="1000" dirty="0">
+                <a:solidFill>
+                  <a:schemeClr val="accent1">
+                    <a:lumMod val="75000"/>
+                  </a:schemeClr>
+                </a:solidFill>
+              </a:rPr>
               <a:t>/</a:t>
             </a:r>
             <a:r>
-              <a:rPr lang="en-AU" sz="1000" dirty="0" err="1"/>
+              <a:rPr lang="en-AU" sz="1000" dirty="0" err="1">
+                <a:solidFill>
+                  <a:schemeClr val="accent1">
+                    <a:lumMod val="75000"/>
+                  </a:schemeClr>
+                </a:solidFill>
+              </a:rPr>
               <a:t>api</a:t>
             </a:r>
             <a:r>
-              <a:rPr lang="en-AU" sz="1000" dirty="0"/>
+              <a:rPr lang="en-AU" sz="1000" dirty="0">
+                <a:solidFill>
+                  <a:schemeClr val="accent1">
+                    <a:lumMod val="75000"/>
+                  </a:schemeClr>
+                </a:solidFill>
+              </a:rPr>
               <a:t>/</a:t>
             </a:r>
             <a:r>
-              <a:rPr lang="en-AU" sz="1000" dirty="0" err="1"/>
+              <a:rPr lang="en-AU" sz="1000" dirty="0" err="1">
+                <a:solidFill>
+                  <a:schemeClr val="accent1">
+                    <a:lumMod val="75000"/>
+                  </a:schemeClr>
+                </a:solidFill>
+              </a:rPr>
               <a:t>TransactionRefund</a:t>
             </a:r>
-            <a:endParaRPr lang="en-AU" sz="1000" dirty="0"/>
-          </a:p>
-          <a:p>
-            <a:endParaRPr lang="en-AU" sz="1000" dirty="0"/>
+            <a:endParaRPr lang="en-AU" sz="1000" dirty="0">
+              <a:solidFill>
+                <a:schemeClr val="accent1">
+                  <a:lumMod val="75000"/>
+                </a:schemeClr>
+              </a:solidFill>
+            </a:endParaRPr>
+          </a:p>
+          <a:p>
+            <a:endParaRPr lang="en-AU" sz="1000" dirty="0">
+              <a:solidFill>
+                <a:schemeClr val="accent1">
+                  <a:lumMod val="75000"/>
+                </a:schemeClr>
+              </a:solidFill>
+            </a:endParaRPr>
           </a:p>
         </p:txBody>
       </p:sp>
@@ -12520,7 +12619,7 @@
         </p:nvSpPr>
         <p:spPr>
           <a:xfrm>
-            <a:off x="10385082" y="4564692"/>
+            <a:off x="10194992" y="5323993"/>
             <a:ext cx="1860415" cy="246221"/>
           </a:xfrm>
           <a:prstGeom prst="rect">
@@ -12535,25 +12634,824 @@
           <a:lstStyle/>
           <a:p>
             <a:r>
-              <a:rPr lang="en-AU" sz="1000" dirty="0"/>
+              <a:rPr lang="en-AU" sz="1000" dirty="0">
+                <a:solidFill>
+                  <a:schemeClr val="accent1">
+                    <a:lumMod val="75000"/>
+                  </a:schemeClr>
+                </a:solidFill>
+              </a:rPr>
               <a:t>/</a:t>
             </a:r>
             <a:r>
-              <a:rPr lang="en-AU" sz="1000" dirty="0" err="1"/>
+              <a:rPr lang="en-AU" sz="1000" dirty="0" err="1">
+                <a:solidFill>
+                  <a:schemeClr val="accent1">
+                    <a:lumMod val="75000"/>
+                  </a:schemeClr>
+                </a:solidFill>
+              </a:rPr>
               <a:t>api</a:t>
             </a:r>
             <a:r>
-              <a:rPr lang="en-AU" sz="1000" dirty="0"/>
+              <a:rPr lang="en-AU" sz="1000" dirty="0">
+                <a:solidFill>
+                  <a:schemeClr val="accent1">
+                    <a:lumMod val="75000"/>
+                  </a:schemeClr>
+                </a:solidFill>
+              </a:rPr>
               <a:t>/</a:t>
             </a:r>
             <a:r>
-              <a:rPr lang="en-AU" sz="1000" dirty="0" err="1"/>
+              <a:rPr lang="en-AU" sz="1000" dirty="0" err="1">
+                <a:solidFill>
+                  <a:schemeClr val="accent1">
+                    <a:lumMod val="75000"/>
+                  </a:schemeClr>
+                </a:solidFill>
+              </a:rPr>
               <a:t>TransactionChanged</a:t>
             </a:r>
-            <a:endParaRPr lang="en-AU" sz="1000" dirty="0"/>
+            <a:endParaRPr lang="en-AU" sz="1000" dirty="0">
+              <a:solidFill>
+                <a:schemeClr val="accent1">
+                  <a:lumMod val="75000"/>
+                </a:schemeClr>
+              </a:solidFill>
+            </a:endParaRPr>
           </a:p>
         </p:txBody>
       </p:sp>
+      <p:sp>
+        <p:nvSpPr>
+          <p:cNvPr id="37" name="TextBox 36">
+            <a:extLst>
+              <a:ext uri="{FF2B5EF4-FFF2-40B4-BE49-F238E27FC236}">
+                <a16:creationId xmlns:a16="http://schemas.microsoft.com/office/drawing/2014/main" id="{F127D982-E241-42DF-8DDE-0F1C672601C1}"/>
+              </a:ext>
+            </a:extLst>
+          </p:cNvPr>
+          <p:cNvSpPr txBox="1"/>
+          <p:nvPr/>
+        </p:nvSpPr>
+        <p:spPr>
+          <a:xfrm>
+            <a:off x="5060483" y="4205219"/>
+            <a:ext cx="2068346" cy="400110"/>
+          </a:xfrm>
+          <a:prstGeom prst="rect">
+            <a:avLst/>
+          </a:prstGeom>
+          <a:noFill/>
+        </p:spPr>
+        <p:txBody>
+          <a:bodyPr wrap="square" rtlCol="0">
+            <a:spAutoFit/>
+          </a:bodyPr>
+          <a:lstStyle/>
+          <a:p>
+            <a:r>
+              <a:rPr lang="en-AU" sz="1000" dirty="0">
+                <a:solidFill>
+                  <a:schemeClr val="accent1">
+                    <a:lumMod val="75000"/>
+                  </a:schemeClr>
+                </a:solidFill>
+              </a:rPr>
+              <a:t>Topic – Resolve My Complaint</a:t>
+            </a:r>
+          </a:p>
+          <a:p>
+            <a:r>
+              <a:rPr lang="en-AU" sz="1000" dirty="0">
+                <a:solidFill>
+                  <a:schemeClr val="accent1">
+                    <a:lumMod val="75000"/>
+                  </a:schemeClr>
+                </a:solidFill>
+              </a:rPr>
+              <a:t>Event Type - </a:t>
+            </a:r>
+            <a:r>
+              <a:rPr lang="en-AU" sz="1000" dirty="0" err="1">
+                <a:solidFill>
+                  <a:schemeClr val="accent1">
+                    <a:lumMod val="75000"/>
+                  </a:schemeClr>
+                </a:solidFill>
+              </a:rPr>
+              <a:t>Purchase.PartialRefund</a:t>
+            </a:r>
+            <a:endParaRPr lang="en-AU" sz="1000" dirty="0">
+              <a:solidFill>
+                <a:schemeClr val="accent1">
+                  <a:lumMod val="75000"/>
+                </a:schemeClr>
+              </a:solidFill>
+            </a:endParaRPr>
+          </a:p>
+        </p:txBody>
+      </p:sp>
+      <p:sp>
+        <p:nvSpPr>
+          <p:cNvPr id="38" name="TextBox 37">
+            <a:extLst>
+              <a:ext uri="{FF2B5EF4-FFF2-40B4-BE49-F238E27FC236}">
+                <a16:creationId xmlns:a16="http://schemas.microsoft.com/office/drawing/2014/main" id="{44DF223A-2F27-4D3C-B54B-2981A4CB2E6D}"/>
+              </a:ext>
+            </a:extLst>
+          </p:cNvPr>
+          <p:cNvSpPr txBox="1"/>
+          <p:nvPr/>
+        </p:nvSpPr>
+        <p:spPr>
+          <a:xfrm>
+            <a:off x="5124645" y="5940718"/>
+            <a:ext cx="1860415" cy="553998"/>
+          </a:xfrm>
+          <a:prstGeom prst="rect">
+            <a:avLst/>
+          </a:prstGeom>
+          <a:noFill/>
+        </p:spPr>
+        <p:txBody>
+          <a:bodyPr wrap="square" rtlCol="0">
+            <a:spAutoFit/>
+          </a:bodyPr>
+          <a:lstStyle/>
+          <a:p>
+            <a:r>
+              <a:rPr lang="en-AU" sz="1000" dirty="0">
+                <a:solidFill>
+                  <a:schemeClr val="accent1">
+                    <a:lumMod val="75000"/>
+                  </a:schemeClr>
+                </a:solidFill>
+              </a:rPr>
+              <a:t>Topic – Cancel My Membership</a:t>
+            </a:r>
+          </a:p>
+          <a:p>
+            <a:r>
+              <a:rPr lang="en-AU" sz="1000" dirty="0">
+                <a:solidFill>
+                  <a:schemeClr val="accent1">
+                    <a:lumMod val="75000"/>
+                  </a:schemeClr>
+                </a:solidFill>
+              </a:rPr>
+              <a:t>Event Type - </a:t>
+            </a:r>
+            <a:r>
+              <a:rPr lang="en-AU" sz="1000" dirty="0" err="1">
+                <a:solidFill>
+                  <a:schemeClr val="accent1">
+                    <a:lumMod val="75000"/>
+                  </a:schemeClr>
+                </a:solidFill>
+              </a:rPr>
+              <a:t>Purchase.Refunded</a:t>
+            </a:r>
+            <a:endParaRPr lang="en-AU" sz="1000" dirty="0">
+              <a:solidFill>
+                <a:schemeClr val="accent1">
+                  <a:lumMod val="75000"/>
+                </a:schemeClr>
+              </a:solidFill>
+            </a:endParaRPr>
+          </a:p>
+          <a:p>
+            <a:endParaRPr lang="en-AU" sz="1000" dirty="0">
+              <a:solidFill>
+                <a:schemeClr val="accent1">
+                  <a:lumMod val="75000"/>
+                </a:schemeClr>
+              </a:solidFill>
+            </a:endParaRPr>
+          </a:p>
+        </p:txBody>
+      </p:sp>
+      <p:pic>
+        <p:nvPicPr>
+          <p:cNvPr id="39" name="Graphic 38">
+            <a:extLst>
+              <a:ext uri="{FF2B5EF4-FFF2-40B4-BE49-F238E27FC236}">
+                <a16:creationId xmlns:a16="http://schemas.microsoft.com/office/drawing/2014/main" id="{9B8D325B-5C4A-406F-B136-0094049BD30B}"/>
+              </a:ext>
+            </a:extLst>
+          </p:cNvPr>
+          <p:cNvPicPr>
+            <a:picLocks noChangeAspect="1"/>
+          </p:cNvPicPr>
+          <p:nvPr/>
+        </p:nvPicPr>
+        <p:blipFill>
+          <a:blip r:embed="rId4">
+            <a:extLst>
+              <a:ext uri="{28A0092B-C50C-407E-A947-70E740481C1C}">
+                <a14:useLocalDpi xmlns:a14="http://schemas.microsoft.com/office/drawing/2010/main" val="0"/>
+              </a:ext>
+              <a:ext uri="{96DAC541-7B7A-43D3-8B79-37D633B846F1}">
+                <asvg:svgBlip xmlns:asvg="http://schemas.microsoft.com/office/drawing/2016/SVG/main" r:embed="rId5"/>
+              </a:ext>
+            </a:extLst>
+          </a:blip>
+          <a:stretch>
+            <a:fillRect/>
+          </a:stretch>
+        </p:blipFill>
+        <p:spPr>
+          <a:xfrm>
+            <a:off x="5763642" y="3483077"/>
+            <a:ext cx="662002" cy="662002"/>
+          </a:xfrm>
+          <a:prstGeom prst="rect">
+            <a:avLst/>
+          </a:prstGeom>
+        </p:spPr>
+      </p:pic>
+      <p:pic>
+        <p:nvPicPr>
+          <p:cNvPr id="40" name="Graphic 39">
+            <a:extLst>
+              <a:ext uri="{FF2B5EF4-FFF2-40B4-BE49-F238E27FC236}">
+                <a16:creationId xmlns:a16="http://schemas.microsoft.com/office/drawing/2014/main" id="{94C66170-951A-460D-8858-F1C9322FBBD0}"/>
+              </a:ext>
+            </a:extLst>
+          </p:cNvPr>
+          <p:cNvPicPr>
+            <a:picLocks noChangeAspect="1"/>
+          </p:cNvPicPr>
+          <p:nvPr/>
+        </p:nvPicPr>
+        <p:blipFill>
+          <a:blip r:embed="rId4">
+            <a:extLst>
+              <a:ext uri="{28A0092B-C50C-407E-A947-70E740481C1C}">
+                <a14:useLocalDpi xmlns:a14="http://schemas.microsoft.com/office/drawing/2010/main" val="0"/>
+              </a:ext>
+              <a:ext uri="{96DAC541-7B7A-43D3-8B79-37D633B846F1}">
+                <asvg:svgBlip xmlns:asvg="http://schemas.microsoft.com/office/drawing/2016/SVG/main" r:embed="rId5"/>
+              </a:ext>
+            </a:extLst>
+          </a:blip>
+          <a:stretch>
+            <a:fillRect/>
+          </a:stretch>
+        </p:blipFill>
+        <p:spPr>
+          <a:xfrm>
+            <a:off x="5764052" y="5163567"/>
+            <a:ext cx="662002" cy="662002"/>
+          </a:xfrm>
+          <a:prstGeom prst="rect">
+            <a:avLst/>
+          </a:prstGeom>
+        </p:spPr>
+      </p:pic>
+      <p:cxnSp>
+        <p:nvCxnSpPr>
+          <p:cNvPr id="43" name="Straight Arrow Connector 42">
+            <a:extLst>
+              <a:ext uri="{FF2B5EF4-FFF2-40B4-BE49-F238E27FC236}">
+                <a16:creationId xmlns:a16="http://schemas.microsoft.com/office/drawing/2014/main" id="{C5A2DF55-8300-4E27-A794-6E2C9F2CBB3A}"/>
+              </a:ext>
+            </a:extLst>
+          </p:cNvPr>
+          <p:cNvCxnSpPr>
+            <a:cxnSpLocks/>
+            <a:stCxn id="40" idx="3"/>
+            <a:endCxn id="35" idx="1"/>
+          </p:cNvCxnSpPr>
+          <p:nvPr/>
+        </p:nvCxnSpPr>
+        <p:spPr>
+          <a:xfrm>
+            <a:off x="6426054" y="5494568"/>
+            <a:ext cx="2850102" cy="28368"/>
+          </a:xfrm>
+          <a:prstGeom prst="straightConnector1">
+            <a:avLst/>
+          </a:prstGeom>
+          <a:ln w="25400" cap="flat" cmpd="sng" algn="ctr">
+            <a:solidFill>
+              <a:schemeClr val="accent1"/>
+            </a:solidFill>
+            <a:prstDash val="dash"/>
+            <a:round/>
+            <a:headEnd type="none" w="med" len="med"/>
+            <a:tailEnd type="arrow" w="lg" len="lg"/>
+          </a:ln>
+        </p:spPr>
+        <p:style>
+          <a:lnRef idx="0">
+            <a:scrgbClr r="0" g="0" b="0"/>
+          </a:lnRef>
+          <a:fillRef idx="0">
+            <a:scrgbClr r="0" g="0" b="0"/>
+          </a:fillRef>
+          <a:effectRef idx="0">
+            <a:scrgbClr r="0" g="0" b="0"/>
+          </a:effectRef>
+          <a:fontRef idx="minor">
+            <a:schemeClr val="tx1"/>
+          </a:fontRef>
+        </p:style>
+      </p:cxnSp>
+      <p:cxnSp>
+        <p:nvCxnSpPr>
+          <p:cNvPr id="45" name="Straight Arrow Connector 44">
+            <a:extLst>
+              <a:ext uri="{FF2B5EF4-FFF2-40B4-BE49-F238E27FC236}">
+                <a16:creationId xmlns:a16="http://schemas.microsoft.com/office/drawing/2014/main" id="{6FC7B727-8A41-4A49-B113-F0A466502EE2}"/>
+              </a:ext>
+            </a:extLst>
+          </p:cNvPr>
+          <p:cNvCxnSpPr>
+            <a:cxnSpLocks/>
+            <a:stCxn id="39" idx="3"/>
+            <a:endCxn id="35" idx="1"/>
+          </p:cNvCxnSpPr>
+          <p:nvPr/>
+        </p:nvCxnSpPr>
+        <p:spPr>
+          <a:xfrm>
+            <a:off x="6425644" y="3814078"/>
+            <a:ext cx="2850512" cy="1708858"/>
+          </a:xfrm>
+          <a:prstGeom prst="straightConnector1">
+            <a:avLst/>
+          </a:prstGeom>
+          <a:ln w="25400" cap="flat" cmpd="sng" algn="ctr">
+            <a:solidFill>
+              <a:schemeClr val="accent1"/>
+            </a:solidFill>
+            <a:prstDash val="dash"/>
+            <a:round/>
+            <a:headEnd type="none" w="med" len="med"/>
+            <a:tailEnd type="arrow" w="lg" len="lg"/>
+          </a:ln>
+        </p:spPr>
+        <p:style>
+          <a:lnRef idx="0">
+            <a:scrgbClr r="0" g="0" b="0"/>
+          </a:lnRef>
+          <a:fillRef idx="0">
+            <a:scrgbClr r="0" g="0" b="0"/>
+          </a:fillRef>
+          <a:effectRef idx="0">
+            <a:scrgbClr r="0" g="0" b="0"/>
+          </a:effectRef>
+          <a:fontRef idx="minor">
+            <a:schemeClr val="tx1"/>
+          </a:fontRef>
+        </p:style>
+      </p:cxnSp>
+      <p:cxnSp>
+        <p:nvCxnSpPr>
+          <p:cNvPr id="48" name="Straight Arrow Connector 47">
+            <a:extLst>
+              <a:ext uri="{FF2B5EF4-FFF2-40B4-BE49-F238E27FC236}">
+                <a16:creationId xmlns:a16="http://schemas.microsoft.com/office/drawing/2014/main" id="{97283C88-74C7-4433-91E8-BCCB3162DECC}"/>
+              </a:ext>
+            </a:extLst>
+          </p:cNvPr>
+          <p:cNvCxnSpPr>
+            <a:cxnSpLocks/>
+            <a:stCxn id="39" idx="3"/>
+            <a:endCxn id="21" idx="1"/>
+          </p:cNvCxnSpPr>
+          <p:nvPr/>
+        </p:nvCxnSpPr>
+        <p:spPr>
+          <a:xfrm flipV="1">
+            <a:off x="6425644" y="2165491"/>
+            <a:ext cx="2848866" cy="1648587"/>
+          </a:xfrm>
+          <a:prstGeom prst="straightConnector1">
+            <a:avLst/>
+          </a:prstGeom>
+          <a:ln w="25400" cap="flat" cmpd="sng" algn="ctr">
+            <a:solidFill>
+              <a:schemeClr val="accent1"/>
+            </a:solidFill>
+            <a:prstDash val="dash"/>
+            <a:round/>
+            <a:headEnd type="none" w="med" len="med"/>
+            <a:tailEnd type="arrow" w="lg" len="lg"/>
+          </a:ln>
+        </p:spPr>
+        <p:style>
+          <a:lnRef idx="0">
+            <a:scrgbClr r="0" g="0" b="0"/>
+          </a:lnRef>
+          <a:fillRef idx="0">
+            <a:scrgbClr r="0" g="0" b="0"/>
+          </a:fillRef>
+          <a:effectRef idx="0">
+            <a:scrgbClr r="0" g="0" b="0"/>
+          </a:effectRef>
+          <a:fontRef idx="minor">
+            <a:schemeClr val="tx1"/>
+          </a:fontRef>
+        </p:style>
+      </p:cxnSp>
+      <p:cxnSp>
+        <p:nvCxnSpPr>
+          <p:cNvPr id="52" name="Straight Arrow Connector 51">
+            <a:extLst>
+              <a:ext uri="{FF2B5EF4-FFF2-40B4-BE49-F238E27FC236}">
+                <a16:creationId xmlns:a16="http://schemas.microsoft.com/office/drawing/2014/main" id="{DCE924CC-EC5F-4D5B-A152-11D01CA11962}"/>
+              </a:ext>
+            </a:extLst>
+          </p:cNvPr>
+          <p:cNvCxnSpPr>
+            <a:cxnSpLocks/>
+            <a:stCxn id="40" idx="3"/>
+            <a:endCxn id="21" idx="1"/>
+          </p:cNvCxnSpPr>
+          <p:nvPr/>
+        </p:nvCxnSpPr>
+        <p:spPr>
+          <a:xfrm flipV="1">
+            <a:off x="6426054" y="2165491"/>
+            <a:ext cx="2848456" cy="3329077"/>
+          </a:xfrm>
+          <a:prstGeom prst="straightConnector1">
+            <a:avLst/>
+          </a:prstGeom>
+          <a:ln w="25400" cap="flat" cmpd="sng" algn="ctr">
+            <a:solidFill>
+              <a:schemeClr val="accent1"/>
+            </a:solidFill>
+            <a:prstDash val="dash"/>
+            <a:round/>
+            <a:headEnd type="none" w="med" len="med"/>
+            <a:tailEnd type="arrow" w="lg" len="lg"/>
+          </a:ln>
+        </p:spPr>
+        <p:style>
+          <a:lnRef idx="0">
+            <a:scrgbClr r="0" g="0" b="0"/>
+          </a:lnRef>
+          <a:fillRef idx="0">
+            <a:scrgbClr r="0" g="0" b="0"/>
+          </a:fillRef>
+          <a:effectRef idx="0">
+            <a:scrgbClr r="0" g="0" b="0"/>
+          </a:effectRef>
+          <a:fontRef idx="minor">
+            <a:schemeClr val="tx1"/>
+          </a:fontRef>
+        </p:style>
+      </p:cxnSp>
+      <p:cxnSp>
+        <p:nvCxnSpPr>
+          <p:cNvPr id="55" name="Straight Connector 54">
+            <a:extLst>
+              <a:ext uri="{FF2B5EF4-FFF2-40B4-BE49-F238E27FC236}">
+                <a16:creationId xmlns:a16="http://schemas.microsoft.com/office/drawing/2014/main" id="{4B6BCA0D-C611-4AC1-BE8D-F955BE3A5257}"/>
+              </a:ext>
+            </a:extLst>
+          </p:cNvPr>
+          <p:cNvCxnSpPr>
+            <a:stCxn id="9" idx="1"/>
+          </p:cNvCxnSpPr>
+          <p:nvPr/>
+        </p:nvCxnSpPr>
+        <p:spPr>
+          <a:xfrm flipH="1">
+            <a:off x="5060483" y="2199571"/>
+            <a:ext cx="619321" cy="0"/>
+          </a:xfrm>
+          <a:prstGeom prst="line">
+            <a:avLst/>
+          </a:prstGeom>
+        </p:spPr>
+        <p:style>
+          <a:lnRef idx="3">
+            <a:schemeClr val="accent1"/>
+          </a:lnRef>
+          <a:fillRef idx="0">
+            <a:schemeClr val="accent1"/>
+          </a:fillRef>
+          <a:effectRef idx="2">
+            <a:schemeClr val="accent1"/>
+          </a:effectRef>
+          <a:fontRef idx="minor">
+            <a:schemeClr val="tx1"/>
+          </a:fontRef>
+        </p:style>
+      </p:cxnSp>
+      <p:sp>
+        <p:nvSpPr>
+          <p:cNvPr id="56" name="Flowchart: Connector 55">
+            <a:extLst>
+              <a:ext uri="{FF2B5EF4-FFF2-40B4-BE49-F238E27FC236}">
+                <a16:creationId xmlns:a16="http://schemas.microsoft.com/office/drawing/2014/main" id="{443FF69D-3B12-4860-9D4D-D4FE71708073}"/>
+              </a:ext>
+            </a:extLst>
+          </p:cNvPr>
+          <p:cNvSpPr/>
+          <p:nvPr/>
+        </p:nvSpPr>
+        <p:spPr>
+          <a:xfrm>
+            <a:off x="4946273" y="2145073"/>
+            <a:ext cx="108000" cy="108000"/>
+          </a:xfrm>
+          <a:prstGeom prst="flowChartConnector">
+            <a:avLst/>
+          </a:prstGeom>
+        </p:spPr>
+        <p:style>
+          <a:lnRef idx="2">
+            <a:schemeClr val="accent1">
+              <a:shade val="50000"/>
+            </a:schemeClr>
+          </a:lnRef>
+          <a:fillRef idx="1">
+            <a:schemeClr val="accent1"/>
+          </a:fillRef>
+          <a:effectRef idx="0">
+            <a:schemeClr val="accent1"/>
+          </a:effectRef>
+          <a:fontRef idx="minor">
+            <a:schemeClr val="lt1"/>
+          </a:fontRef>
+        </p:style>
+        <p:txBody>
+          <a:bodyPr rtlCol="0" anchor="ctr"/>
+          <a:lstStyle/>
+          <a:p>
+            <a:pPr algn="ctr"/>
+            <a:endParaRPr lang="en-AU"/>
+          </a:p>
+        </p:txBody>
+      </p:sp>
+      <p:cxnSp>
+        <p:nvCxnSpPr>
+          <p:cNvPr id="57" name="Straight Connector 56">
+            <a:extLst>
+              <a:ext uri="{FF2B5EF4-FFF2-40B4-BE49-F238E27FC236}">
+                <a16:creationId xmlns:a16="http://schemas.microsoft.com/office/drawing/2014/main" id="{A151EDF3-C72C-4593-AD2A-683B34C8E232}"/>
+              </a:ext>
+            </a:extLst>
+          </p:cNvPr>
+          <p:cNvCxnSpPr/>
+          <p:nvPr/>
+        </p:nvCxnSpPr>
+        <p:spPr>
+          <a:xfrm flipH="1">
+            <a:off x="5060483" y="3800483"/>
+            <a:ext cx="619321" cy="0"/>
+          </a:xfrm>
+          <a:prstGeom prst="line">
+            <a:avLst/>
+          </a:prstGeom>
+        </p:spPr>
+        <p:style>
+          <a:lnRef idx="3">
+            <a:schemeClr val="accent1"/>
+          </a:lnRef>
+          <a:fillRef idx="0">
+            <a:schemeClr val="accent1"/>
+          </a:fillRef>
+          <a:effectRef idx="2">
+            <a:schemeClr val="accent1"/>
+          </a:effectRef>
+          <a:fontRef idx="minor">
+            <a:schemeClr val="tx1"/>
+          </a:fontRef>
+        </p:style>
+      </p:cxnSp>
+      <p:sp>
+        <p:nvSpPr>
+          <p:cNvPr id="58" name="Flowchart: Connector 57">
+            <a:extLst>
+              <a:ext uri="{FF2B5EF4-FFF2-40B4-BE49-F238E27FC236}">
+                <a16:creationId xmlns:a16="http://schemas.microsoft.com/office/drawing/2014/main" id="{18F18B8A-C398-43EE-9700-504EA7C7A7C8}"/>
+              </a:ext>
+            </a:extLst>
+          </p:cNvPr>
+          <p:cNvSpPr/>
+          <p:nvPr/>
+        </p:nvSpPr>
+        <p:spPr>
+          <a:xfrm>
+            <a:off x="4946273" y="3745985"/>
+            <a:ext cx="108000" cy="108000"/>
+          </a:xfrm>
+          <a:prstGeom prst="flowChartConnector">
+            <a:avLst/>
+          </a:prstGeom>
+        </p:spPr>
+        <p:style>
+          <a:lnRef idx="2">
+            <a:schemeClr val="accent1">
+              <a:shade val="50000"/>
+            </a:schemeClr>
+          </a:lnRef>
+          <a:fillRef idx="1">
+            <a:schemeClr val="accent1"/>
+          </a:fillRef>
+          <a:effectRef idx="0">
+            <a:schemeClr val="accent1"/>
+          </a:effectRef>
+          <a:fontRef idx="minor">
+            <a:schemeClr val="lt1"/>
+          </a:fontRef>
+        </p:style>
+        <p:txBody>
+          <a:bodyPr rtlCol="0" anchor="ctr"/>
+          <a:lstStyle/>
+          <a:p>
+            <a:pPr algn="ctr"/>
+            <a:endParaRPr lang="en-AU"/>
+          </a:p>
+        </p:txBody>
+      </p:sp>
+      <p:cxnSp>
+        <p:nvCxnSpPr>
+          <p:cNvPr id="59" name="Straight Connector 58">
+            <a:extLst>
+              <a:ext uri="{FF2B5EF4-FFF2-40B4-BE49-F238E27FC236}">
+                <a16:creationId xmlns:a16="http://schemas.microsoft.com/office/drawing/2014/main" id="{0C565394-EBEE-42C7-A12E-E0E86EF678C9}"/>
+              </a:ext>
+            </a:extLst>
+          </p:cNvPr>
+          <p:cNvCxnSpPr/>
+          <p:nvPr/>
+        </p:nvCxnSpPr>
+        <p:spPr>
+          <a:xfrm flipH="1">
+            <a:off x="5054273" y="5496810"/>
+            <a:ext cx="619321" cy="0"/>
+          </a:xfrm>
+          <a:prstGeom prst="line">
+            <a:avLst/>
+          </a:prstGeom>
+        </p:spPr>
+        <p:style>
+          <a:lnRef idx="3">
+            <a:schemeClr val="accent1"/>
+          </a:lnRef>
+          <a:fillRef idx="0">
+            <a:schemeClr val="accent1"/>
+          </a:fillRef>
+          <a:effectRef idx="2">
+            <a:schemeClr val="accent1"/>
+          </a:effectRef>
+          <a:fontRef idx="minor">
+            <a:schemeClr val="tx1"/>
+          </a:fontRef>
+        </p:style>
+      </p:cxnSp>
+      <p:sp>
+        <p:nvSpPr>
+          <p:cNvPr id="60" name="Flowchart: Connector 59">
+            <a:extLst>
+              <a:ext uri="{FF2B5EF4-FFF2-40B4-BE49-F238E27FC236}">
+                <a16:creationId xmlns:a16="http://schemas.microsoft.com/office/drawing/2014/main" id="{1DCF1C95-FB52-49FC-97DE-DED3DD79956C}"/>
+              </a:ext>
+            </a:extLst>
+          </p:cNvPr>
+          <p:cNvSpPr/>
+          <p:nvPr/>
+        </p:nvSpPr>
+        <p:spPr>
+          <a:xfrm>
+            <a:off x="4940063" y="5442312"/>
+            <a:ext cx="108000" cy="108000"/>
+          </a:xfrm>
+          <a:prstGeom prst="flowChartConnector">
+            <a:avLst/>
+          </a:prstGeom>
+        </p:spPr>
+        <p:style>
+          <a:lnRef idx="2">
+            <a:schemeClr val="accent1">
+              <a:shade val="50000"/>
+            </a:schemeClr>
+          </a:lnRef>
+          <a:fillRef idx="1">
+            <a:schemeClr val="accent1"/>
+          </a:fillRef>
+          <a:effectRef idx="0">
+            <a:schemeClr val="accent1"/>
+          </a:effectRef>
+          <a:fontRef idx="minor">
+            <a:schemeClr val="lt1"/>
+          </a:fontRef>
+        </p:style>
+        <p:txBody>
+          <a:bodyPr rtlCol="0" anchor="ctr"/>
+          <a:lstStyle/>
+          <a:p>
+            <a:pPr algn="ctr"/>
+            <a:endParaRPr lang="en-AU"/>
+          </a:p>
+        </p:txBody>
+      </p:sp>
+      <p:cxnSp>
+        <p:nvCxnSpPr>
+          <p:cNvPr id="62" name="Straight Arrow Connector 46">
+            <a:extLst>
+              <a:ext uri="{FF2B5EF4-FFF2-40B4-BE49-F238E27FC236}">
+                <a16:creationId xmlns:a16="http://schemas.microsoft.com/office/drawing/2014/main" id="{010870DB-610E-4BA1-8224-7D822A5CD42F}"/>
+              </a:ext>
+            </a:extLst>
+          </p:cNvPr>
+          <p:cNvCxnSpPr>
+            <a:cxnSpLocks/>
+            <a:stCxn id="6" idx="3"/>
+            <a:endCxn id="58" idx="1"/>
+          </p:cNvCxnSpPr>
+          <p:nvPr/>
+        </p:nvCxnSpPr>
+        <p:spPr>
+          <a:xfrm>
+            <a:off x="2842499" y="3273584"/>
+            <a:ext cx="2119590" cy="488217"/>
+          </a:xfrm>
+          <a:prstGeom prst="curvedConnector2">
+            <a:avLst/>
+          </a:prstGeom>
+          <a:ln w="25400" cap="flat" cmpd="sng" algn="ctr">
+            <a:solidFill>
+              <a:schemeClr val="accent1"/>
+            </a:solidFill>
+            <a:prstDash val="dash"/>
+            <a:round/>
+            <a:headEnd type="none" w="med" len="med"/>
+            <a:tailEnd type="arrow" w="lg" len="lg"/>
+          </a:ln>
+        </p:spPr>
+        <p:style>
+          <a:lnRef idx="0">
+            <a:scrgbClr r="0" g="0" b="0"/>
+          </a:lnRef>
+          <a:fillRef idx="0">
+            <a:scrgbClr r="0" g="0" b="0"/>
+          </a:fillRef>
+          <a:effectRef idx="0">
+            <a:scrgbClr r="0" g="0" b="0"/>
+          </a:effectRef>
+          <a:fontRef idx="minor">
+            <a:schemeClr val="tx1"/>
+          </a:fontRef>
+        </p:style>
+      </p:cxnSp>
+      <p:cxnSp>
+        <p:nvCxnSpPr>
+          <p:cNvPr id="63" name="Straight Arrow Connector 46">
+            <a:extLst>
+              <a:ext uri="{FF2B5EF4-FFF2-40B4-BE49-F238E27FC236}">
+                <a16:creationId xmlns:a16="http://schemas.microsoft.com/office/drawing/2014/main" id="{8AE76C3E-73FE-4E32-8303-B3C1941B9580}"/>
+              </a:ext>
+            </a:extLst>
+          </p:cNvPr>
+          <p:cNvCxnSpPr>
+            <a:cxnSpLocks/>
+            <a:stCxn id="6" idx="3"/>
+            <a:endCxn id="60" idx="2"/>
+          </p:cNvCxnSpPr>
+          <p:nvPr/>
+        </p:nvCxnSpPr>
+        <p:spPr>
+          <a:xfrm>
+            <a:off x="2842499" y="3273584"/>
+            <a:ext cx="2097564" cy="2222728"/>
+          </a:xfrm>
+          <a:prstGeom prst="curvedConnector3">
+            <a:avLst/>
+          </a:prstGeom>
+          <a:ln w="25400" cap="flat" cmpd="sng" algn="ctr">
+            <a:solidFill>
+              <a:schemeClr val="accent1"/>
+            </a:solidFill>
+            <a:prstDash val="dash"/>
+            <a:round/>
+            <a:headEnd type="none" w="med" len="med"/>
+            <a:tailEnd type="arrow" w="lg" len="lg"/>
+          </a:ln>
+        </p:spPr>
+        <p:style>
+          <a:lnRef idx="0">
+            <a:scrgbClr r="0" g="0" b="0"/>
+          </a:lnRef>
+          <a:fillRef idx="0">
+            <a:scrgbClr r="0" g="0" b="0"/>
+          </a:fillRef>
+          <a:effectRef idx="0">
+            <a:scrgbClr r="0" g="0" b="0"/>
+          </a:effectRef>
+          <a:fontRef idx="minor">
+            <a:schemeClr val="tx1"/>
+          </a:fontRef>
+        </p:style>
+      </p:cxnSp>
     </p:spTree>
     <p:extLst>
       <p:ext uri="{BB962C8B-B14F-4D97-AF65-F5344CB8AC3E}">
@@ -17515,7 +18413,7 @@
             <a:pPr algn="ctr"/>
             <a:r>
               <a:rPr lang="en-AU" dirty="0"/>
-              <a:t>(Referrer)</a:t>
+              <a:t>(Partner)</a:t>
             </a:r>
           </a:p>
         </p:txBody>
@@ -18117,7 +19015,7 @@
                   <a:schemeClr val="accent1"/>
                 </a:solidFill>
               </a:rPr>
-              <a:t>1a - referrer driven subscription</a:t>
+              <a:t>1a - partner driven subscription</a:t>
             </a:r>
           </a:p>
         </p:txBody>

</xml_diff>

<commit_message>
Renamed partner to affiliate
</commit_message>
<xml_diff>
--- a/Outbound Integrations.pptx
+++ b/Outbound Integrations.pptx
@@ -123,10 +123,6 @@
     </p:ext>
   </p:extLst>
 </p:presentation>
-</file>
-
-<file path=ppt/revisionInfo.xml><?xml version="1.0" encoding="utf-8"?>
-<p1510:revInfo xmlns:a="http://schemas.openxmlformats.org/drawingml/2006/main" xmlns:r="http://schemas.openxmlformats.org/officeDocument/2006/relationships" xmlns:p1510="http://schemas.microsoft.com/office/powerpoint/2015/10/main"/>
 </file>
 
 <file path=ppt/diagrams/colors1.xml><?xml version="1.0" encoding="utf-8"?>
@@ -8999,7 +8995,7 @@
           <a:p>
             <a:fld id="{35ACAB7E-9791-46EF-9C56-9B9A6246B142}" type="datetimeFigureOut">
               <a:rPr lang="en-AU" smtClean="0"/>
-              <a:t>6/04/2018</a:t>
+              <a:t>29/04/2018</a:t>
             </a:fld>
             <a:endParaRPr lang="en-AU"/>
           </a:p>
@@ -9752,7 +9748,7 @@
           <a:p>
             <a:fld id="{D3A58CAA-286E-417A-8488-C377A93EE4A8}" type="datetimeFigureOut">
               <a:rPr lang="en-AU" smtClean="0"/>
-              <a:t>6/04/2018</a:t>
+              <a:t>29/04/2018</a:t>
             </a:fld>
             <a:endParaRPr lang="en-AU"/>
           </a:p>
@@ -9952,7 +9948,7 @@
           <a:p>
             <a:fld id="{D3A58CAA-286E-417A-8488-C377A93EE4A8}" type="datetimeFigureOut">
               <a:rPr lang="en-AU" smtClean="0"/>
-              <a:t>6/04/2018</a:t>
+              <a:t>29/04/2018</a:t>
             </a:fld>
             <a:endParaRPr lang="en-AU"/>
           </a:p>
@@ -10162,7 +10158,7 @@
           <a:p>
             <a:fld id="{D3A58CAA-286E-417A-8488-C377A93EE4A8}" type="datetimeFigureOut">
               <a:rPr lang="en-AU" smtClean="0"/>
-              <a:t>6/04/2018</a:t>
+              <a:t>29/04/2018</a:t>
             </a:fld>
             <a:endParaRPr lang="en-AU"/>
           </a:p>
@@ -10362,7 +10358,7 @@
           <a:p>
             <a:fld id="{D3A58CAA-286E-417A-8488-C377A93EE4A8}" type="datetimeFigureOut">
               <a:rPr lang="en-AU" smtClean="0"/>
-              <a:t>6/04/2018</a:t>
+              <a:t>29/04/2018</a:t>
             </a:fld>
             <a:endParaRPr lang="en-AU"/>
           </a:p>
@@ -10638,7 +10634,7 @@
           <a:p>
             <a:fld id="{D3A58CAA-286E-417A-8488-C377A93EE4A8}" type="datetimeFigureOut">
               <a:rPr lang="en-AU" smtClean="0"/>
-              <a:t>6/04/2018</a:t>
+              <a:t>29/04/2018</a:t>
             </a:fld>
             <a:endParaRPr lang="en-AU"/>
           </a:p>
@@ -10906,7 +10902,7 @@
           <a:p>
             <a:fld id="{D3A58CAA-286E-417A-8488-C377A93EE4A8}" type="datetimeFigureOut">
               <a:rPr lang="en-AU" smtClean="0"/>
-              <a:t>6/04/2018</a:t>
+              <a:t>29/04/2018</a:t>
             </a:fld>
             <a:endParaRPr lang="en-AU"/>
           </a:p>
@@ -11321,7 +11317,7 @@
           <a:p>
             <a:fld id="{D3A58CAA-286E-417A-8488-C377A93EE4A8}" type="datetimeFigureOut">
               <a:rPr lang="en-AU" smtClean="0"/>
-              <a:t>6/04/2018</a:t>
+              <a:t>29/04/2018</a:t>
             </a:fld>
             <a:endParaRPr lang="en-AU"/>
           </a:p>
@@ -11463,7 +11459,7 @@
           <a:p>
             <a:fld id="{D3A58CAA-286E-417A-8488-C377A93EE4A8}" type="datetimeFigureOut">
               <a:rPr lang="en-AU" smtClean="0"/>
-              <a:t>6/04/2018</a:t>
+              <a:t>29/04/2018</a:t>
             </a:fld>
             <a:endParaRPr lang="en-AU"/>
           </a:p>
@@ -11576,7 +11572,7 @@
           <a:p>
             <a:fld id="{D3A58CAA-286E-417A-8488-C377A93EE4A8}" type="datetimeFigureOut">
               <a:rPr lang="en-AU" smtClean="0"/>
-              <a:t>6/04/2018</a:t>
+              <a:t>29/04/2018</a:t>
             </a:fld>
             <a:endParaRPr lang="en-AU"/>
           </a:p>
@@ -11889,7 +11885,7 @@
           <a:p>
             <a:fld id="{D3A58CAA-286E-417A-8488-C377A93EE4A8}" type="datetimeFigureOut">
               <a:rPr lang="en-AU" smtClean="0"/>
-              <a:t>6/04/2018</a:t>
+              <a:t>29/04/2018</a:t>
             </a:fld>
             <a:endParaRPr lang="en-AU"/>
           </a:p>
@@ -12178,7 +12174,7 @@
           <a:p>
             <a:fld id="{D3A58CAA-286E-417A-8488-C377A93EE4A8}" type="datetimeFigureOut">
               <a:rPr lang="en-AU" smtClean="0"/>
-              <a:t>6/04/2018</a:t>
+              <a:t>29/04/2018</a:t>
             </a:fld>
             <a:endParaRPr lang="en-AU"/>
           </a:p>
@@ -12421,7 +12417,7 @@
           <a:p>
             <a:fld id="{D3A58CAA-286E-417A-8488-C377A93EE4A8}" type="datetimeFigureOut">
               <a:rPr lang="en-AU" smtClean="0"/>
-              <a:t>6/04/2018</a:t>
+              <a:t>29/04/2018</a:t>
             </a:fld>
             <a:endParaRPr lang="en-AU"/>
           </a:p>
@@ -12889,7 +12885,7 @@
           <a:p>
             <a:r>
               <a:rPr lang="en-AU" dirty="0"/>
-              <a:t>aka communicating system events to partners</a:t>
+              <a:t>aka communicating system events to affiliates</a:t>
             </a:r>
           </a:p>
         </p:txBody>
@@ -13439,8 +13435,8 @@
         </p:nvSpPr>
         <p:spPr>
           <a:xfrm>
-            <a:off x="9803161" y="1905643"/>
-            <a:ext cx="1727166" cy="400110"/>
+            <a:off x="9803160" y="1905643"/>
+            <a:ext cx="2323387" cy="707886"/>
           </a:xfrm>
           <a:prstGeom prst="rect">
             <a:avLst/>
@@ -13455,7 +13451,7 @@
           <a:p>
             <a:r>
               <a:rPr lang="en-AU" sz="2000" b="1" dirty="0"/>
-              <a:t>Partner-A API</a:t>
+              <a:t>Affiliate-A Webhook</a:t>
             </a:r>
           </a:p>
         </p:txBody>
@@ -13534,7 +13530,7 @@
           <a:p>
             <a:r>
               <a:rPr lang="en-AU" sz="1400" b="1" dirty="0"/>
-              <a:t>3- sub filter = “Partner-A”</a:t>
+              <a:t>3- sub filter = “Affiliate-A”</a:t>
             </a:r>
           </a:p>
         </p:txBody>
@@ -13593,7 +13589,7 @@
         <p:spPr>
           <a:xfrm>
             <a:off x="9803161" y="5271074"/>
-            <a:ext cx="2121464" cy="1138773"/>
+            <a:ext cx="2121464" cy="1446550"/>
           </a:xfrm>
           <a:prstGeom prst="rect">
             <a:avLst/>
@@ -13608,7 +13604,7 @@
           <a:p>
             <a:r>
               <a:rPr lang="en-AU" sz="2000" b="1" dirty="0"/>
-              <a:t>Partner-B API</a:t>
+              <a:t>Affiliate-B Webhook</a:t>
             </a:r>
           </a:p>
           <a:p>
@@ -13862,7 +13858,7 @@
           <a:p>
             <a:r>
               <a:rPr lang="en-AU" sz="1400" b="1" dirty="0"/>
-              <a:t>3- sub filter = “Partner-B”</a:t>
+              <a:t>3- sub filter = “Affiliate-B”</a:t>
             </a:r>
           </a:p>
         </p:txBody>
@@ -13903,7 +13899,7 @@
                   </a:schemeClr>
                 </a:solidFill>
               </a:rPr>
-              <a:t>/api/</a:t>
+              <a:t>/</a:t>
             </a:r>
             <a:r>
               <a:rPr lang="en-AU" sz="1000" dirty="0" err="1">
@@ -13913,7 +13909,27 @@
                   </a:schemeClr>
                 </a:solidFill>
               </a:rPr>
-              <a:t>TransactionChanged</a:t>
+              <a:t>api</a:t>
+            </a:r>
+            <a:r>
+              <a:rPr lang="en-AU" sz="1000" dirty="0">
+                <a:solidFill>
+                  <a:schemeClr val="accent1">
+                    <a:lumMod val="75000"/>
+                  </a:schemeClr>
+                </a:solidFill>
+              </a:rPr>
+              <a:t>/</a:t>
+            </a:r>
+            <a:r>
+              <a:rPr lang="en-AU" sz="1000" dirty="0" err="1">
+                <a:solidFill>
+                  <a:schemeClr val="accent1">
+                    <a:lumMod val="75000"/>
+                  </a:schemeClr>
+                </a:solidFill>
+              </a:rPr>
+              <a:t>WebhookA</a:t>
             </a:r>
             <a:endParaRPr lang="en-AU" sz="1000" dirty="0">
               <a:solidFill>
@@ -14787,7 +14803,7 @@
           <a:p>
             <a:r>
               <a:rPr lang="en-AU" dirty="0"/>
-              <a:t>Insurance provider wants to share customer events, with partner organisations. e.g. policy purchased, activated, refunded, etc.</a:t>
+              <a:t>Insurance provider wants to share customer events, with affiliate organisations. e.g. policy purchased, activated, refunded, etc.</a:t>
             </a:r>
           </a:p>
           <a:p>
@@ -15013,7 +15029,7 @@
           <a:p>
             <a:r>
               <a:rPr lang="en-AU" sz="2000" dirty="0"/>
-              <a:t>costly for insurer and partner to operate due to wasted calls</a:t>
+              <a:t>costly for insurer and affiliate to operate due to wasted calls</a:t>
             </a:r>
           </a:p>
           <a:p>
@@ -15318,7 +15334,7 @@
               <a:pPr algn="ctr"/>
               <a:r>
                 <a:rPr lang="en-AU" sz="1600" b="1" dirty="0"/>
-                <a:t>Partner</a:t>
+                <a:t>Affiliate</a:t>
               </a:r>
             </a:p>
             <a:p>
@@ -16526,7 +16542,7 @@
             <a:pPr algn="ctr"/>
             <a:r>
               <a:rPr lang="en-AU" sz="1400" b="1" dirty="0"/>
-              <a:t>Partner</a:t>
+              <a:t>Affiliate</a:t>
             </a:r>
           </a:p>
           <a:p>
@@ -16990,7 +17006,7 @@
             <a:pPr algn="ctr"/>
             <a:r>
               <a:rPr lang="en-AU" sz="1400" dirty="0"/>
-              <a:t>Partner Core</a:t>
+              <a:t>Affiliate Core</a:t>
             </a:r>
           </a:p>
           <a:p>
@@ -17268,7 +17284,7 @@
             </a:pPr>
             <a:r>
               <a:rPr lang="en-AU" sz="1800" dirty="0"/>
-              <a:t>A HUB mediates between insurer and partner systems</a:t>
+              <a:t>A HUB mediates between insurer and affiliate systems</a:t>
             </a:r>
           </a:p>
           <a:p>
@@ -17283,7 +17299,7 @@
             </a:pPr>
             <a:r>
               <a:rPr lang="en-AU" sz="1800" dirty="0"/>
-              <a:t>Subscriptions are verified by hub by issuing a challenge to subscriber (partner) and expecting back a result with validation code</a:t>
+              <a:t>Subscriptions are verified by hub by issuing a challenge to subscriber (affiliate) and expecting back a result with validation code</a:t>
             </a:r>
           </a:p>
           <a:p>
@@ -17304,7 +17320,7 @@
           <a:p>
             <a:r>
               <a:rPr lang="en-AU" sz="1800" dirty="0"/>
-              <a:t>light ping – (3) insurer pushes event only, (5) partner subsequently pulls full data from insurer API</a:t>
+              <a:t>light ping – (3) insurer pushes event only, (5) affiliate subsequently pulls full data from insurer API</a:t>
             </a:r>
           </a:p>
           <a:p>
@@ -17510,7 +17526,7 @@
             <a:pPr algn="ctr"/>
             <a:r>
               <a:rPr lang="en-AU" sz="1400" b="1" dirty="0"/>
-              <a:t>Partner</a:t>
+              <a:t>Affiliate</a:t>
             </a:r>
           </a:p>
           <a:p>
@@ -18154,7 +18170,7 @@
             <a:pPr algn="ctr"/>
             <a:r>
               <a:rPr lang="en-AU" sz="1400" b="1" dirty="0"/>
-              <a:t>Partner Core</a:t>
+              <a:t>Affiliate Core</a:t>
             </a:r>
           </a:p>
           <a:p>
@@ -18395,7 +18411,7 @@
             </a:r>
             <a:r>
               <a:rPr lang="en-AU" sz="1600" dirty="0"/>
-              <a:t>insurer hosts custom platform extension code provided by partners</a:t>
+              <a:t>insurer hosts custom platform extension code provided by affiliates</a:t>
             </a:r>
           </a:p>
         </p:txBody>
@@ -18487,7 +18503,7 @@
             <a:pPr algn="ctr"/>
             <a:r>
               <a:rPr lang="en-AU" sz="1400" b="1" dirty="0"/>
-              <a:t>Partner provided</a:t>
+              <a:t>Affiliate provided</a:t>
             </a:r>
           </a:p>
           <a:p>
@@ -18588,7 +18604,7 @@
             <a:pPr algn="ctr"/>
             <a:r>
               <a:rPr lang="en-AU" sz="1400" b="1" dirty="0"/>
-              <a:t>Partner Core</a:t>
+              <a:t>Affiliate Core</a:t>
             </a:r>
           </a:p>
           <a:p>
@@ -19029,7 +19045,7 @@
                   <a:schemeClr val="tx2"/>
                 </a:solidFill>
               </a:rPr>
-              <a:t>Code could be polling, webhook consumer, or anything else that partner requires</a:t>
+              <a:t>Code could be polling, webhook consumer, or anything else that affiliate requires</a:t>
             </a:r>
           </a:p>
         </p:txBody>
@@ -19667,7 +19683,7 @@
             <a:pPr algn="ctr"/>
             <a:r>
               <a:rPr lang="en-AU" dirty="0"/>
-              <a:t>(Partner)</a:t>
+              <a:t>(Affiliate)</a:t>
             </a:r>
           </a:p>
         </p:txBody>
@@ -20269,7 +20285,7 @@
                   <a:schemeClr val="accent1"/>
                 </a:solidFill>
               </a:rPr>
-              <a:t>1a - partner driven subscription</a:t>
+              <a:t>1a - affiliate driven subscription</a:t>
             </a:r>
           </a:p>
         </p:txBody>

</xml_diff>